<commit_message>
changed the design of the resume
</commit_message>
<xml_diff>
--- a/resource/brijesh-resume.pptx
+++ b/resource/brijesh-resume.pptx
@@ -3473,7 +3473,7 @@
         <p:spPr>
           <a:xfrm>
             <a:off x="88889" y="148084"/>
-            <a:ext cx="3071675" cy="600164"/>
+            <a:ext cx="3172663" cy="600164"/>
           </a:xfrm>
           <a:prstGeom prst="rect">
             <a:avLst/>
@@ -3487,7 +3487,7 @@
           <a:lstStyle/>
           <a:p>
             <a:r>
-              <a:rPr lang="en-US" sz="3300" dirty="0" smtClean="0">
+              <a:rPr lang="en-US" sz="3300" dirty="0" err="1" smtClean="0">
                 <a:latin typeface="Roboto Thin" charset="0"/>
                 <a:ea typeface="Roboto Thin" charset="0"/>
                 <a:cs typeface="Roboto Thin" charset="0"/>
@@ -3495,7 +3495,15 @@
               <a:t>Brijesh</a:t>
             </a:r>
             <a:r>
-              <a:rPr lang="en-US" sz="3300" dirty="0" smtClean="0">
+              <a:rPr lang="en-US" sz="3300" smtClean="0">
+                <a:latin typeface="Roboto Thin" charset="0"/>
+                <a:ea typeface="Roboto Thin" charset="0"/>
+                <a:cs typeface="Roboto Thin" charset="0"/>
+              </a:rPr>
+              <a:t> </a:t>
+            </a:r>
+            <a:r>
+              <a:rPr lang="en-US" sz="3300" smtClean="0">
                 <a:latin typeface="Roboto" charset="0"/>
                 <a:ea typeface="Roboto" charset="0"/>
                 <a:cs typeface="Roboto" charset="0"/>
@@ -6121,23 +6129,10 @@
                     <a:latin typeface="Oxygen Light"/>
                     <a:cs typeface="Oxygen Light"/>
                   </a:rPr>
-                  <a:t>Built a Hologram Generator using </a:t>
-                </a:r>
-                <a:r>
-                  <a:rPr lang="en-US" sz="900" smtClean="0">
-                    <a:solidFill>
-                      <a:schemeClr val="tx1">
-                        <a:lumMod val="50000"/>
-                        <a:lumOff val="50000"/>
-                      </a:schemeClr>
-                    </a:solidFill>
-                    <a:latin typeface="Oxygen Light"/>
-                    <a:cs typeface="Oxygen Light"/>
-                  </a:rPr>
-                  <a:t>a </a:t>
-                </a:r>
-                <a:r>
-                  <a:rPr lang="en-US" sz="900" smtClean="0">
+                  <a:t>Built a Hologram Generator using a </a:t>
+                </a:r>
+                <a:r>
+                  <a:rPr lang="en-US" sz="900" dirty="0" smtClean="0">
                     <a:solidFill>
                       <a:schemeClr val="tx1">
                         <a:lumMod val="50000"/>

</xml_diff>